<commit_message>
Added installation via cargo to README
</commit_message>
<xml_diff>
--- a/docs/presentation.pptx
+++ b/docs/presentation.pptx
@@ -25466,7 +25466,7 @@
             </a:pPr>
             <a:r>
               <a:rPr lang="de-CH" noProof="0" dirty="0"/>
-              <a:t>TABLE OF CONTENTS</a:t>
+              <a:t>Inhalt</a:t>
             </a:r>
           </a:p>
         </p:txBody>
@@ -27886,7 +27886,15 @@
             </a:pPr>
             <a:r>
               <a:rPr lang="de-CH" noProof="0" dirty="0"/>
-              <a:t>Notizen werden mit User-ID versehen</a:t>
+              <a:t>Notizen werden </a:t>
+            </a:r>
+            <a:r>
+              <a:rPr lang="de-CH" noProof="0"/>
+              <a:t>mit ID </a:t>
+            </a:r>
+            <a:r>
+              <a:rPr lang="de-CH" noProof="0" dirty="0"/>
+              <a:t>versehen</a:t>
             </a:r>
           </a:p>
         </p:txBody>

</xml_diff>